<commit_message>
feat: add rainfall pipeline to sytem-design AB#6152
</commit_message>
<xml_diff>
--- a/system-design/IBF-system-design.pptx
+++ b/system-design/IBF-system-design.pptx
@@ -5,7 +5,7 @@
     <p:sldMasterId id="2147483648" r:id="rId1"/>
   </p:sldMasterIdLst>
   <p:notesMasterIdLst>
-    <p:notesMasterId r:id="rId8"/>
+    <p:notesMasterId r:id="rId9"/>
   </p:notesMasterIdLst>
   <p:sldIdLst>
     <p:sldId id="1271" r:id="rId2"/>
@@ -14,6 +14,7 @@
     <p:sldId id="1270" r:id="rId5"/>
     <p:sldId id="1268" r:id="rId6"/>
     <p:sldId id="1267" r:id="rId7"/>
+    <p:sldId id="1275" r:id="rId8"/>
   </p:sldIdLst>
   <p:sldSz cx="12192000" cy="6858000"/>
   <p:notesSz cx="6858000" cy="9144000"/>
@@ -210,7 +211,7 @@
           <a:p>
             <a:fld id="{345EC93F-2FB2-4901-AF13-4510760ACBED}" type="datetimeFigureOut">
               <a:rPr lang="nl-NL" smtClean="0"/>
-              <a:t>20-7-2020</a:t>
+              <a:t>15-2-2021</a:t>
             </a:fld>
             <a:endParaRPr lang="nl-NL"/>
           </a:p>
@@ -1048,6 +1049,120 @@
 </p:notes>
 </file>
 
+<file path=ppt/notesSlides/notesSlide6.xml><?xml version="1.0" encoding="utf-8"?>
+<p:notes xmlns:a="http://schemas.openxmlformats.org/drawingml/2006/main" xmlns:r="http://schemas.openxmlformats.org/officeDocument/2006/relationships" xmlns:p="http://schemas.openxmlformats.org/presentationml/2006/main">
+  <p:cSld>
+    <p:spTree>
+      <p:nvGrpSpPr>
+        <p:cNvPr id="1" name=""/>
+        <p:cNvGrpSpPr/>
+        <p:nvPr/>
+      </p:nvGrpSpPr>
+      <p:grpSpPr>
+        <a:xfrm>
+          <a:off x="0" y="0"/>
+          <a:ext cx="0" cy="0"/>
+          <a:chOff x="0" y="0"/>
+          <a:chExt cx="0" cy="0"/>
+        </a:xfrm>
+      </p:grpSpPr>
+      <p:sp>
+        <p:nvSpPr>
+          <p:cNvPr id="2" name="Tijdelijke aanduiding voor dia-afbeelding 1"/>
+          <p:cNvSpPr>
+            <a:spLocks noGrp="1" noRot="1" noChangeAspect="1"/>
+          </p:cNvSpPr>
+          <p:nvPr>
+            <p:ph type="sldImg"/>
+          </p:nvPr>
+        </p:nvSpPr>
+        <p:spPr/>
+      </p:sp>
+      <p:sp>
+        <p:nvSpPr>
+          <p:cNvPr id="3" name="Tijdelijke aanduiding voor notities 2"/>
+          <p:cNvSpPr>
+            <a:spLocks noGrp="1"/>
+          </p:cNvSpPr>
+          <p:nvPr>
+            <p:ph type="body" idx="1"/>
+          </p:nvPr>
+        </p:nvSpPr>
+        <p:spPr/>
+        <p:txBody>
+          <a:bodyPr/>
+          <a:lstStyle/>
+          <a:p>
+            <a:r>
+              <a:rPr lang="nl-NL" dirty="0"/>
+              <a:t>Links boven: iets in trant van </a:t>
+            </a:r>
+            <a:r>
+              <a:rPr lang="nl-NL" b="1" dirty="0"/>
+              <a:t>Anno 2015 </a:t>
+            </a:r>
+            <a:r>
+              <a:rPr lang="nl-NL" b="0" dirty="0"/>
+              <a:t>(ook op volgende slide)</a:t>
+            </a:r>
+          </a:p>
+          <a:p>
+            <a:r>
+              <a:rPr lang="nl-NL" dirty="0"/>
+              <a:t>Klinkt flauw, maar Rode Kruis is geen NGO, dus</a:t>
+            </a:r>
+            <a:r>
+              <a:rPr lang="nl-NL" baseline="0" dirty="0"/>
+              <a:t> liefst die er bij zetten. Wij hebben het over Rode, Blauwe en NGO kanaal; </a:t>
+            </a:r>
+          </a:p>
+          <a:p>
+            <a:r>
+              <a:rPr lang="nl-NL" baseline="0" dirty="0"/>
+              <a:t>Overheden kan je wellicht hier weglaten; al kunnen die evengoed in rampsituaties overstappen naar cash voor hun eigen bevolking (gebeurt natuurlijk in meer ontwikkelde landen). </a:t>
+            </a:r>
+          </a:p>
+          <a:p>
+            <a:endParaRPr lang="nl-NL" dirty="0"/>
+          </a:p>
+        </p:txBody>
+      </p:sp>
+      <p:sp>
+        <p:nvSpPr>
+          <p:cNvPr id="4" name="Tijdelijke aanduiding voor dianummer 3"/>
+          <p:cNvSpPr>
+            <a:spLocks noGrp="1"/>
+          </p:cNvSpPr>
+          <p:nvPr>
+            <p:ph type="sldNum" sz="quarter" idx="10"/>
+          </p:nvPr>
+        </p:nvSpPr>
+        <p:spPr/>
+        <p:txBody>
+          <a:bodyPr/>
+          <a:lstStyle/>
+          <a:p>
+            <a:fld id="{96808D2B-C29D-4575-B417-C470A29D6F69}" type="slidenum">
+              <a:rPr lang="nl-NL" smtClean="0"/>
+              <a:t>7</a:t>
+            </a:fld>
+            <a:endParaRPr lang="nl-NL"/>
+          </a:p>
+        </p:txBody>
+      </p:sp>
+    </p:spTree>
+    <p:extLst>
+      <p:ext uri="{BB962C8B-B14F-4D97-AF65-F5344CB8AC3E}">
+        <p14:creationId xmlns:p14="http://schemas.microsoft.com/office/powerpoint/2010/main" val="978918704"/>
+      </p:ext>
+    </p:extLst>
+  </p:cSld>
+  <p:clrMapOvr>
+    <a:masterClrMapping/>
+  </p:clrMapOvr>
+</p:notes>
+</file>
+
 <file path=ppt/slideLayouts/slideLayout1.xml><?xml version="1.0" encoding="utf-8"?>
 <p:sldLayout xmlns:a="http://schemas.openxmlformats.org/drawingml/2006/main" xmlns:r="http://schemas.openxmlformats.org/officeDocument/2006/relationships" xmlns:p="http://schemas.openxmlformats.org/presentationml/2006/main" type="title" preserve="1">
   <p:cSld name="Title Slide">
@@ -1197,7 +1312,7 @@
           <a:p>
             <a:fld id="{C9D9F6F7-B47A-464A-A8AE-36A936C395BC}" type="datetimeFigureOut">
               <a:rPr lang="nl-NL" smtClean="0"/>
-              <a:t>20-7-2020</a:t>
+              <a:t>15-2-2021</a:t>
             </a:fld>
             <a:endParaRPr lang="nl-NL"/>
           </a:p>
@@ -1397,7 +1512,7 @@
           <a:p>
             <a:fld id="{C9D9F6F7-B47A-464A-A8AE-36A936C395BC}" type="datetimeFigureOut">
               <a:rPr lang="nl-NL" smtClean="0"/>
-              <a:t>20-7-2020</a:t>
+              <a:t>15-2-2021</a:t>
             </a:fld>
             <a:endParaRPr lang="nl-NL"/>
           </a:p>
@@ -1607,7 +1722,7 @@
           <a:p>
             <a:fld id="{C9D9F6F7-B47A-464A-A8AE-36A936C395BC}" type="datetimeFigureOut">
               <a:rPr lang="nl-NL" smtClean="0"/>
-              <a:t>20-7-2020</a:t>
+              <a:t>15-2-2021</a:t>
             </a:fld>
             <a:endParaRPr lang="nl-NL"/>
           </a:p>
@@ -1807,7 +1922,7 @@
           <a:p>
             <a:fld id="{C9D9F6F7-B47A-464A-A8AE-36A936C395BC}" type="datetimeFigureOut">
               <a:rPr lang="nl-NL" smtClean="0"/>
-              <a:t>20-7-2020</a:t>
+              <a:t>15-2-2021</a:t>
             </a:fld>
             <a:endParaRPr lang="nl-NL"/>
           </a:p>
@@ -2083,7 +2198,7 @@
           <a:p>
             <a:fld id="{C9D9F6F7-B47A-464A-A8AE-36A936C395BC}" type="datetimeFigureOut">
               <a:rPr lang="nl-NL" smtClean="0"/>
-              <a:t>20-7-2020</a:t>
+              <a:t>15-2-2021</a:t>
             </a:fld>
             <a:endParaRPr lang="nl-NL"/>
           </a:p>
@@ -2351,7 +2466,7 @@
           <a:p>
             <a:fld id="{C9D9F6F7-B47A-464A-A8AE-36A936C395BC}" type="datetimeFigureOut">
               <a:rPr lang="nl-NL" smtClean="0"/>
-              <a:t>20-7-2020</a:t>
+              <a:t>15-2-2021</a:t>
             </a:fld>
             <a:endParaRPr lang="nl-NL"/>
           </a:p>
@@ -2766,7 +2881,7 @@
           <a:p>
             <a:fld id="{C9D9F6F7-B47A-464A-A8AE-36A936C395BC}" type="datetimeFigureOut">
               <a:rPr lang="nl-NL" smtClean="0"/>
-              <a:t>20-7-2020</a:t>
+              <a:t>15-2-2021</a:t>
             </a:fld>
             <a:endParaRPr lang="nl-NL"/>
           </a:p>
@@ -2908,7 +3023,7 @@
           <a:p>
             <a:fld id="{C9D9F6F7-B47A-464A-A8AE-36A936C395BC}" type="datetimeFigureOut">
               <a:rPr lang="nl-NL" smtClean="0"/>
-              <a:t>20-7-2020</a:t>
+              <a:t>15-2-2021</a:t>
             </a:fld>
             <a:endParaRPr lang="nl-NL"/>
           </a:p>
@@ -3021,7 +3136,7 @@
           <a:p>
             <a:fld id="{C9D9F6F7-B47A-464A-A8AE-36A936C395BC}" type="datetimeFigureOut">
               <a:rPr lang="nl-NL" smtClean="0"/>
-              <a:t>20-7-2020</a:t>
+              <a:t>15-2-2021</a:t>
             </a:fld>
             <a:endParaRPr lang="nl-NL"/>
           </a:p>
@@ -3334,7 +3449,7 @@
           <a:p>
             <a:fld id="{C9D9F6F7-B47A-464A-A8AE-36A936C395BC}" type="datetimeFigureOut">
               <a:rPr lang="nl-NL" smtClean="0"/>
-              <a:t>20-7-2020</a:t>
+              <a:t>15-2-2021</a:t>
             </a:fld>
             <a:endParaRPr lang="nl-NL"/>
           </a:p>
@@ -3623,7 +3738,7 @@
           <a:p>
             <a:fld id="{C9D9F6F7-B47A-464A-A8AE-36A936C395BC}" type="datetimeFigureOut">
               <a:rPr lang="nl-NL" smtClean="0"/>
-              <a:t>20-7-2020</a:t>
+              <a:t>15-2-2021</a:t>
             </a:fld>
             <a:endParaRPr lang="nl-NL"/>
           </a:p>
@@ -3866,7 +3981,7 @@
           <a:p>
             <a:fld id="{C9D9F6F7-B47A-464A-A8AE-36A936C395BC}" type="datetimeFigureOut">
               <a:rPr lang="nl-NL" smtClean="0"/>
-              <a:t>20-7-2020</a:t>
+              <a:t>15-2-2021</a:t>
             </a:fld>
             <a:endParaRPr lang="nl-NL"/>
           </a:p>
@@ -6535,13 +6650,22 @@
           <a:lstStyle/>
           <a:p>
             <a:r>
+              <a:rPr lang="nl-NL" sz="2400" b="1" dirty="0">
+                <a:solidFill>
+                  <a:schemeClr val="tx1"/>
+                </a:solidFill>
+                <a:latin typeface="+mj-lt"/>
+              </a:rPr>
+              <a:t>Design of IBF-pipeline (made </a:t>
+            </a:r>
+            <a:r>
               <a:rPr lang="nl-NL" sz="2400" b="1" dirty="0" err="1">
                 <a:solidFill>
                   <a:schemeClr val="tx1"/>
                 </a:solidFill>
                 <a:latin typeface="+mj-lt"/>
               </a:rPr>
-              <a:t>Older</a:t>
+              <a:t>initially</a:t>
             </a:r>
             <a:r>
               <a:rPr lang="nl-NL" sz="2400" b="1" dirty="0">
@@ -6550,7 +6674,25 @@
                 </a:solidFill>
                 <a:latin typeface="+mj-lt"/>
               </a:rPr>
-              <a:t> design of FBF-Zambia system</a:t>
+              <a:t> </a:t>
+            </a:r>
+            <a:r>
+              <a:rPr lang="nl-NL" sz="2400" b="1" dirty="0" err="1">
+                <a:solidFill>
+                  <a:schemeClr val="tx1"/>
+                </a:solidFill>
+                <a:latin typeface="+mj-lt"/>
+              </a:rPr>
+              <a:t>for</a:t>
+            </a:r>
+            <a:r>
+              <a:rPr lang="nl-NL" sz="2400" b="1" dirty="0">
+                <a:solidFill>
+                  <a:schemeClr val="tx1"/>
+                </a:solidFill>
+                <a:latin typeface="+mj-lt"/>
+              </a:rPr>
+              <a:t> FBF Zambia)</a:t>
             </a:r>
           </a:p>
         </p:txBody>
@@ -10952,6 +11094,1082 @@
     <p:extLst>
       <p:ext uri="{BB962C8B-B14F-4D97-AF65-F5344CB8AC3E}">
         <p14:creationId xmlns:p14="http://schemas.microsoft.com/office/powerpoint/2010/main" val="2837520556"/>
+      </p:ext>
+    </p:extLst>
+  </p:cSld>
+  <p:clrMapOvr>
+    <a:masterClrMapping/>
+  </p:clrMapOvr>
+</p:sld>
+</file>
+
+<file path=ppt/slides/slide7.xml><?xml version="1.0" encoding="utf-8"?>
+<p:sld xmlns:a="http://schemas.openxmlformats.org/drawingml/2006/main" xmlns:r="http://schemas.openxmlformats.org/officeDocument/2006/relationships" xmlns:p="http://schemas.openxmlformats.org/presentationml/2006/main">
+  <p:cSld>
+    <p:spTree>
+      <p:nvGrpSpPr>
+        <p:cNvPr id="1" name=""/>
+        <p:cNvGrpSpPr/>
+        <p:nvPr/>
+      </p:nvGrpSpPr>
+      <p:grpSpPr>
+        <a:xfrm>
+          <a:off x="0" y="0"/>
+          <a:ext cx="0" cy="0"/>
+          <a:chOff x="0" y="0"/>
+          <a:chExt cx="0" cy="0"/>
+        </a:xfrm>
+      </p:grpSpPr>
+      <p:sp>
+        <p:nvSpPr>
+          <p:cNvPr id="191" name="Rectangle 190">
+            <a:extLst>
+              <a:ext uri="{FF2B5EF4-FFF2-40B4-BE49-F238E27FC236}">
+                <a16:creationId xmlns:a16="http://schemas.microsoft.com/office/drawing/2014/main" id="{076CA903-E8BB-4396-94E4-E5A2E8FE0B5E}"/>
+              </a:ext>
+            </a:extLst>
+          </p:cNvPr>
+          <p:cNvSpPr/>
+          <p:nvPr/>
+        </p:nvSpPr>
+        <p:spPr>
+          <a:xfrm>
+            <a:off x="2262553" y="2070100"/>
+            <a:ext cx="8989647" cy="4686300"/>
+          </a:xfrm>
+          <a:prstGeom prst="rect">
+            <a:avLst/>
+          </a:prstGeom>
+          <a:solidFill>
+            <a:schemeClr val="bg1">
+              <a:lumMod val="95000"/>
+            </a:schemeClr>
+          </a:solidFill>
+          <a:ln>
+            <a:solidFill>
+              <a:srgbClr val="002060"/>
+            </a:solidFill>
+            <a:prstDash val="dash"/>
+          </a:ln>
+        </p:spPr>
+        <p:style>
+          <a:lnRef idx="2">
+            <a:schemeClr val="accent1">
+              <a:shade val="50000"/>
+            </a:schemeClr>
+          </a:lnRef>
+          <a:fillRef idx="1">
+            <a:schemeClr val="accent1"/>
+          </a:fillRef>
+          <a:effectRef idx="0">
+            <a:schemeClr val="accent1"/>
+          </a:effectRef>
+          <a:fontRef idx="minor">
+            <a:schemeClr val="lt1"/>
+          </a:fontRef>
+        </p:style>
+        <p:txBody>
+          <a:bodyPr rtlCol="0" anchor="ctr"/>
+          <a:lstStyle/>
+          <a:p>
+            <a:pPr algn="ctr"/>
+            <a:endParaRPr lang="en-GB" sz="1200" dirty="0"/>
+          </a:p>
+        </p:txBody>
+      </p:sp>
+      <p:sp>
+        <p:nvSpPr>
+          <p:cNvPr id="12" name="TextBox 11"/>
+          <p:cNvSpPr txBox="1"/>
+          <p:nvPr/>
+        </p:nvSpPr>
+        <p:spPr>
+          <a:xfrm>
+            <a:off x="122604" y="41913"/>
+            <a:ext cx="11916996" cy="461665"/>
+          </a:xfrm>
+          <a:prstGeom prst="rect">
+            <a:avLst/>
+          </a:prstGeom>
+          <a:noFill/>
+          <a:ln>
+            <a:noFill/>
+          </a:ln>
+        </p:spPr>
+        <p:style>
+          <a:lnRef idx="2">
+            <a:schemeClr val="accent1"/>
+          </a:lnRef>
+          <a:fillRef idx="1">
+            <a:schemeClr val="lt1"/>
+          </a:fillRef>
+          <a:effectRef idx="0">
+            <a:schemeClr val="accent1"/>
+          </a:effectRef>
+          <a:fontRef idx="minor">
+            <a:schemeClr val="dk1"/>
+          </a:fontRef>
+        </p:style>
+        <p:txBody>
+          <a:bodyPr wrap="square" rtlCol="0">
+            <a:spAutoFit/>
+          </a:bodyPr>
+          <a:lstStyle/>
+          <a:p>
+            <a:r>
+              <a:rPr lang="nl-NL" sz="2400" b="1" dirty="0">
+                <a:solidFill>
+                  <a:schemeClr val="tx1"/>
+                </a:solidFill>
+                <a:latin typeface="+mj-lt"/>
+              </a:rPr>
+              <a:t>Pipeline </a:t>
+            </a:r>
+            <a:r>
+              <a:rPr lang="nl-NL" sz="2400" b="1" dirty="0" err="1">
+                <a:solidFill>
+                  <a:schemeClr val="tx1"/>
+                </a:solidFill>
+                <a:latin typeface="+mj-lt"/>
+              </a:rPr>
+              <a:t>adapted</a:t>
+            </a:r>
+            <a:r>
+              <a:rPr lang="nl-NL" sz="2400" b="1" dirty="0">
+                <a:solidFill>
+                  <a:schemeClr val="tx1"/>
+                </a:solidFill>
+                <a:latin typeface="+mj-lt"/>
+              </a:rPr>
+              <a:t> </a:t>
+            </a:r>
+            <a:r>
+              <a:rPr lang="nl-NL" sz="2400" b="1" dirty="0" err="1">
+                <a:solidFill>
+                  <a:schemeClr val="tx1"/>
+                </a:solidFill>
+                <a:latin typeface="+mj-lt"/>
+              </a:rPr>
+              <a:t>for</a:t>
+            </a:r>
+            <a:r>
+              <a:rPr lang="nl-NL" sz="2400" b="1" dirty="0">
+                <a:solidFill>
+                  <a:schemeClr val="tx1"/>
+                </a:solidFill>
+                <a:latin typeface="+mj-lt"/>
+              </a:rPr>
+              <a:t> </a:t>
+            </a:r>
+            <a:r>
+              <a:rPr lang="nl-NL" sz="2400" b="1" dirty="0" err="1">
+                <a:solidFill>
+                  <a:schemeClr val="tx1"/>
+                </a:solidFill>
+                <a:latin typeface="+mj-lt"/>
+              </a:rPr>
+              <a:t>Rainfall</a:t>
+            </a:r>
+            <a:r>
+              <a:rPr lang="nl-NL" sz="2400" b="1" dirty="0">
+                <a:solidFill>
+                  <a:schemeClr val="tx1"/>
+                </a:solidFill>
+                <a:latin typeface="+mj-lt"/>
+              </a:rPr>
+              <a:t> model / Egypt</a:t>
+            </a:r>
+          </a:p>
+        </p:txBody>
+      </p:sp>
+      <p:sp>
+        <p:nvSpPr>
+          <p:cNvPr id="2" name="Rectangle 1">
+            <a:extLst>
+              <a:ext uri="{FF2B5EF4-FFF2-40B4-BE49-F238E27FC236}">
+                <a16:creationId xmlns:a16="http://schemas.microsoft.com/office/drawing/2014/main" id="{AA4EBF35-5AA3-4890-A6A2-BE2450F7A9FF}"/>
+              </a:ext>
+            </a:extLst>
+          </p:cNvPr>
+          <p:cNvSpPr/>
+          <p:nvPr/>
+        </p:nvSpPr>
+        <p:spPr>
+          <a:xfrm>
+            <a:off x="2382715" y="4871006"/>
+            <a:ext cx="1485900" cy="835269"/>
+          </a:xfrm>
+          <a:prstGeom prst="rect">
+            <a:avLst/>
+          </a:prstGeom>
+        </p:spPr>
+        <p:style>
+          <a:lnRef idx="2">
+            <a:schemeClr val="accent1">
+              <a:shade val="50000"/>
+            </a:schemeClr>
+          </a:lnRef>
+          <a:fillRef idx="1">
+            <a:schemeClr val="accent1"/>
+          </a:fillRef>
+          <a:effectRef idx="0">
+            <a:schemeClr val="accent1"/>
+          </a:effectRef>
+          <a:fontRef idx="minor">
+            <a:schemeClr val="lt1"/>
+          </a:fontRef>
+        </p:style>
+        <p:txBody>
+          <a:bodyPr rtlCol="0" anchor="ctr"/>
+          <a:lstStyle/>
+          <a:p>
+            <a:pPr algn="ctr"/>
+            <a:r>
+              <a:rPr lang="en-GB" sz="1200" dirty="0"/>
+              <a:t>Daily forecast of rainfall per pixel </a:t>
+            </a:r>
+          </a:p>
+        </p:txBody>
+      </p:sp>
+      <p:sp>
+        <p:nvSpPr>
+          <p:cNvPr id="143" name="Rectangle 142">
+            <a:extLst>
+              <a:ext uri="{FF2B5EF4-FFF2-40B4-BE49-F238E27FC236}">
+                <a16:creationId xmlns:a16="http://schemas.microsoft.com/office/drawing/2014/main" id="{E7E2C2F5-AAC3-4F59-BEBF-A1734F9548C5}"/>
+              </a:ext>
+            </a:extLst>
+          </p:cNvPr>
+          <p:cNvSpPr/>
+          <p:nvPr/>
+        </p:nvSpPr>
+        <p:spPr>
+          <a:xfrm>
+            <a:off x="4325815" y="3710422"/>
+            <a:ext cx="1485900" cy="1094641"/>
+          </a:xfrm>
+          <a:prstGeom prst="rect">
+            <a:avLst/>
+          </a:prstGeom>
+        </p:spPr>
+        <p:style>
+          <a:lnRef idx="2">
+            <a:schemeClr val="accent1">
+              <a:shade val="50000"/>
+            </a:schemeClr>
+          </a:lnRef>
+          <a:fillRef idx="1">
+            <a:schemeClr val="accent1"/>
+          </a:fillRef>
+          <a:effectRef idx="0">
+            <a:schemeClr val="accent1"/>
+          </a:effectRef>
+          <a:fontRef idx="minor">
+            <a:schemeClr val="lt1"/>
+          </a:fontRef>
+        </p:style>
+        <p:txBody>
+          <a:bodyPr rtlCol="0" anchor="ctr"/>
+          <a:lstStyle/>
+          <a:p>
+            <a:pPr algn="ctr"/>
+            <a:r>
+              <a:rPr lang="en-GB" sz="1200" dirty="0"/>
+              <a:t>“Heavy rainfall” yes/no per pixel</a:t>
+            </a:r>
+          </a:p>
+        </p:txBody>
+      </p:sp>
+      <p:cxnSp>
+        <p:nvCxnSpPr>
+          <p:cNvPr id="145" name="Connector: Elbow 144">
+            <a:extLst>
+              <a:ext uri="{FF2B5EF4-FFF2-40B4-BE49-F238E27FC236}">
+                <a16:creationId xmlns:a16="http://schemas.microsoft.com/office/drawing/2014/main" id="{22470728-287C-4C9B-8E02-16728C25AE48}"/>
+              </a:ext>
+            </a:extLst>
+          </p:cNvPr>
+          <p:cNvCxnSpPr>
+            <a:cxnSpLocks/>
+            <a:endCxn id="143" idx="1"/>
+          </p:cNvCxnSpPr>
+          <p:nvPr/>
+        </p:nvCxnSpPr>
+        <p:spPr>
+          <a:xfrm>
+            <a:off x="3868615" y="3644478"/>
+            <a:ext cx="457200" cy="613265"/>
+          </a:xfrm>
+          <a:prstGeom prst="bentConnector3">
+            <a:avLst>
+              <a:gd name="adj1" fmla="val 50000"/>
+            </a:avLst>
+          </a:prstGeom>
+          <a:ln>
+            <a:tailEnd type="triangle"/>
+          </a:ln>
+        </p:spPr>
+        <p:style>
+          <a:lnRef idx="1">
+            <a:schemeClr val="accent1"/>
+          </a:lnRef>
+          <a:fillRef idx="0">
+            <a:schemeClr val="accent1"/>
+          </a:fillRef>
+          <a:effectRef idx="0">
+            <a:schemeClr val="accent1"/>
+          </a:effectRef>
+          <a:fontRef idx="minor">
+            <a:schemeClr val="tx1"/>
+          </a:fontRef>
+        </p:style>
+      </p:cxnSp>
+      <p:cxnSp>
+        <p:nvCxnSpPr>
+          <p:cNvPr id="146" name="Connector: Elbow 145">
+            <a:extLst>
+              <a:ext uri="{FF2B5EF4-FFF2-40B4-BE49-F238E27FC236}">
+                <a16:creationId xmlns:a16="http://schemas.microsoft.com/office/drawing/2014/main" id="{7430CF39-C8B2-4F7A-8448-03B70764C8AF}"/>
+              </a:ext>
+            </a:extLst>
+          </p:cNvPr>
+          <p:cNvCxnSpPr>
+            <a:cxnSpLocks/>
+            <a:stCxn id="2" idx="3"/>
+            <a:endCxn id="143" idx="1"/>
+          </p:cNvCxnSpPr>
+          <p:nvPr/>
+        </p:nvCxnSpPr>
+        <p:spPr>
+          <a:xfrm flipV="1">
+            <a:off x="3868615" y="4257743"/>
+            <a:ext cx="457200" cy="1030898"/>
+          </a:xfrm>
+          <a:prstGeom prst="bentConnector3">
+            <a:avLst/>
+          </a:prstGeom>
+          <a:ln>
+            <a:tailEnd type="triangle"/>
+          </a:ln>
+        </p:spPr>
+        <p:style>
+          <a:lnRef idx="1">
+            <a:schemeClr val="accent1"/>
+          </a:lnRef>
+          <a:fillRef idx="0">
+            <a:schemeClr val="accent1"/>
+          </a:fillRef>
+          <a:effectRef idx="0">
+            <a:schemeClr val="accent1"/>
+          </a:effectRef>
+          <a:fontRef idx="minor">
+            <a:schemeClr val="tx1"/>
+          </a:fontRef>
+        </p:style>
+      </p:cxnSp>
+      <p:sp>
+        <p:nvSpPr>
+          <p:cNvPr id="175" name="Rectangle 174">
+            <a:extLst>
+              <a:ext uri="{FF2B5EF4-FFF2-40B4-BE49-F238E27FC236}">
+                <a16:creationId xmlns:a16="http://schemas.microsoft.com/office/drawing/2014/main" id="{D026A9D4-993A-459E-A50D-56EE3982E90E}"/>
+              </a:ext>
+            </a:extLst>
+          </p:cNvPr>
+          <p:cNvSpPr/>
+          <p:nvPr/>
+        </p:nvSpPr>
+        <p:spPr>
+          <a:xfrm>
+            <a:off x="6093072" y="5814966"/>
+            <a:ext cx="1485900" cy="835269"/>
+          </a:xfrm>
+          <a:prstGeom prst="rect">
+            <a:avLst/>
+          </a:prstGeom>
+          <a:solidFill>
+            <a:schemeClr val="bg1">
+              <a:lumMod val="65000"/>
+            </a:schemeClr>
+          </a:solidFill>
+        </p:spPr>
+        <p:style>
+          <a:lnRef idx="2">
+            <a:schemeClr val="accent1">
+              <a:shade val="50000"/>
+            </a:schemeClr>
+          </a:lnRef>
+          <a:fillRef idx="1">
+            <a:schemeClr val="accent1"/>
+          </a:fillRef>
+          <a:effectRef idx="0">
+            <a:schemeClr val="accent1"/>
+          </a:effectRef>
+          <a:fontRef idx="minor">
+            <a:schemeClr val="lt1"/>
+          </a:fontRef>
+        </p:style>
+        <p:txBody>
+          <a:bodyPr rot="0" spcFirstLastPara="0" vertOverflow="overflow" horzOverflow="overflow" vert="horz" wrap="square" lIns="91440" tIns="45720" rIns="91440" bIns="45720" numCol="1" spcCol="0" rtlCol="0" fromWordArt="0" anchor="ctr" anchorCtr="0" forceAA="0" compatLnSpc="1">
+            <a:prstTxWarp prst="textNoShape">
+              <a:avLst/>
+            </a:prstTxWarp>
+            <a:noAutofit/>
+          </a:bodyPr>
+          <a:lstStyle/>
+          <a:p>
+            <a:pPr algn="ctr"/>
+            <a:r>
+              <a:rPr lang="nl-NL" sz="1200" dirty="0" err="1"/>
+              <a:t>Population</a:t>
+            </a:r>
+            <a:r>
+              <a:rPr lang="nl-NL" sz="1200" dirty="0"/>
+              <a:t> raster</a:t>
+            </a:r>
+          </a:p>
+        </p:txBody>
+      </p:sp>
+      <p:cxnSp>
+        <p:nvCxnSpPr>
+          <p:cNvPr id="179" name="Connector: Elbow 178">
+            <a:extLst>
+              <a:ext uri="{FF2B5EF4-FFF2-40B4-BE49-F238E27FC236}">
+                <a16:creationId xmlns:a16="http://schemas.microsoft.com/office/drawing/2014/main" id="{61FFEA04-5B5F-4BD4-B8F6-61B597D02B3A}"/>
+              </a:ext>
+            </a:extLst>
+          </p:cNvPr>
+          <p:cNvCxnSpPr>
+            <a:cxnSpLocks/>
+            <a:stCxn id="143" idx="3"/>
+            <a:endCxn id="181" idx="1"/>
+          </p:cNvCxnSpPr>
+          <p:nvPr/>
+        </p:nvCxnSpPr>
+        <p:spPr>
+          <a:xfrm>
+            <a:off x="5811715" y="4257743"/>
+            <a:ext cx="2048614" cy="613263"/>
+          </a:xfrm>
+          <a:prstGeom prst="bentConnector3">
+            <a:avLst>
+              <a:gd name="adj1" fmla="val 50000"/>
+            </a:avLst>
+          </a:prstGeom>
+          <a:ln>
+            <a:tailEnd type="triangle"/>
+          </a:ln>
+        </p:spPr>
+        <p:style>
+          <a:lnRef idx="1">
+            <a:schemeClr val="accent1"/>
+          </a:lnRef>
+          <a:fillRef idx="0">
+            <a:schemeClr val="accent1"/>
+          </a:fillRef>
+          <a:effectRef idx="0">
+            <a:schemeClr val="accent1"/>
+          </a:effectRef>
+          <a:fontRef idx="minor">
+            <a:schemeClr val="tx1"/>
+          </a:fontRef>
+        </p:style>
+      </p:cxnSp>
+      <p:cxnSp>
+        <p:nvCxnSpPr>
+          <p:cNvPr id="180" name="Connector: Elbow 179">
+            <a:extLst>
+              <a:ext uri="{FF2B5EF4-FFF2-40B4-BE49-F238E27FC236}">
+                <a16:creationId xmlns:a16="http://schemas.microsoft.com/office/drawing/2014/main" id="{5B387138-8780-48EC-B1A2-DC071D19FBBE}"/>
+              </a:ext>
+            </a:extLst>
+          </p:cNvPr>
+          <p:cNvCxnSpPr>
+            <a:cxnSpLocks/>
+            <a:stCxn id="175" idx="3"/>
+            <a:endCxn id="181" idx="1"/>
+          </p:cNvCxnSpPr>
+          <p:nvPr/>
+        </p:nvCxnSpPr>
+        <p:spPr>
+          <a:xfrm flipV="1">
+            <a:off x="7578972" y="4871006"/>
+            <a:ext cx="281357" cy="1361595"/>
+          </a:xfrm>
+          <a:prstGeom prst="bentConnector3">
+            <a:avLst>
+              <a:gd name="adj1" fmla="val 50000"/>
+            </a:avLst>
+          </a:prstGeom>
+          <a:ln>
+            <a:tailEnd type="triangle"/>
+          </a:ln>
+        </p:spPr>
+        <p:style>
+          <a:lnRef idx="1">
+            <a:schemeClr val="accent1"/>
+          </a:lnRef>
+          <a:fillRef idx="0">
+            <a:schemeClr val="accent1"/>
+          </a:fillRef>
+          <a:effectRef idx="0">
+            <a:schemeClr val="accent1"/>
+          </a:effectRef>
+          <a:fontRef idx="minor">
+            <a:schemeClr val="tx1"/>
+          </a:fontRef>
+        </p:style>
+      </p:cxnSp>
+      <p:sp>
+        <p:nvSpPr>
+          <p:cNvPr id="181" name="Rectangle 180">
+            <a:extLst>
+              <a:ext uri="{FF2B5EF4-FFF2-40B4-BE49-F238E27FC236}">
+                <a16:creationId xmlns:a16="http://schemas.microsoft.com/office/drawing/2014/main" id="{A768B1A3-84F9-47D6-9B65-173DC5A3974B}"/>
+              </a:ext>
+            </a:extLst>
+          </p:cNvPr>
+          <p:cNvSpPr/>
+          <p:nvPr/>
+        </p:nvSpPr>
+        <p:spPr>
+          <a:xfrm>
+            <a:off x="7860329" y="4323685"/>
+            <a:ext cx="1485900" cy="1094641"/>
+          </a:xfrm>
+          <a:prstGeom prst="rect">
+            <a:avLst/>
+          </a:prstGeom>
+        </p:spPr>
+        <p:style>
+          <a:lnRef idx="2">
+            <a:schemeClr val="accent1">
+              <a:shade val="50000"/>
+            </a:schemeClr>
+          </a:lnRef>
+          <a:fillRef idx="1">
+            <a:schemeClr val="accent1"/>
+          </a:fillRef>
+          <a:effectRef idx="0">
+            <a:schemeClr val="accent1"/>
+          </a:effectRef>
+          <a:fontRef idx="minor">
+            <a:schemeClr val="lt1"/>
+          </a:fontRef>
+        </p:style>
+        <p:txBody>
+          <a:bodyPr rtlCol="0" anchor="ctr"/>
+          <a:lstStyle/>
+          <a:p>
+            <a:pPr algn="ctr"/>
+            <a:r>
+              <a:rPr lang="en-GB" sz="1200" dirty="0"/>
+              <a:t>Exposed population raster</a:t>
+            </a:r>
+          </a:p>
+        </p:txBody>
+      </p:sp>
+      <p:sp>
+        <p:nvSpPr>
+          <p:cNvPr id="185" name="Rectangle 184">
+            <a:extLst>
+              <a:ext uri="{FF2B5EF4-FFF2-40B4-BE49-F238E27FC236}">
+                <a16:creationId xmlns:a16="http://schemas.microsoft.com/office/drawing/2014/main" id="{FF30AB90-7EF5-473F-9D41-C6D79149F772}"/>
+              </a:ext>
+            </a:extLst>
+          </p:cNvPr>
+          <p:cNvSpPr/>
+          <p:nvPr/>
+        </p:nvSpPr>
+        <p:spPr>
+          <a:xfrm>
+            <a:off x="7860329" y="5814966"/>
+            <a:ext cx="1485900" cy="835269"/>
+          </a:xfrm>
+          <a:prstGeom prst="rect">
+            <a:avLst/>
+          </a:prstGeom>
+          <a:solidFill>
+            <a:schemeClr val="bg1">
+              <a:lumMod val="65000"/>
+            </a:schemeClr>
+          </a:solidFill>
+        </p:spPr>
+        <p:style>
+          <a:lnRef idx="2">
+            <a:schemeClr val="accent1">
+              <a:shade val="50000"/>
+            </a:schemeClr>
+          </a:lnRef>
+          <a:fillRef idx="1">
+            <a:schemeClr val="accent1"/>
+          </a:fillRef>
+          <a:effectRef idx="0">
+            <a:schemeClr val="accent1"/>
+          </a:effectRef>
+          <a:fontRef idx="minor">
+            <a:schemeClr val="lt1"/>
+          </a:fontRef>
+        </p:style>
+        <p:txBody>
+          <a:bodyPr rot="0" spcFirstLastPara="0" vertOverflow="overflow" horzOverflow="overflow" vert="horz" wrap="square" lIns="91440" tIns="45720" rIns="91440" bIns="45720" numCol="1" spcCol="0" rtlCol="0" fromWordArt="0" anchor="ctr" anchorCtr="0" forceAA="0" compatLnSpc="1">
+            <a:prstTxWarp prst="textNoShape">
+              <a:avLst/>
+            </a:prstTxWarp>
+            <a:noAutofit/>
+          </a:bodyPr>
+          <a:lstStyle/>
+          <a:p>
+            <a:pPr algn="ctr"/>
+            <a:r>
+              <a:rPr lang="nl-NL" sz="1200" dirty="0"/>
+              <a:t>Admin1 (</a:t>
+            </a:r>
+            <a:r>
+              <a:rPr lang="nl-NL" sz="1200" dirty="0" err="1"/>
+              <a:t>governorate</a:t>
+            </a:r>
+            <a:r>
+              <a:rPr lang="nl-NL" sz="1200" dirty="0"/>
+              <a:t>) </a:t>
+            </a:r>
+            <a:r>
+              <a:rPr lang="nl-NL" sz="1200" dirty="0" err="1"/>
+              <a:t>boundary</a:t>
+            </a:r>
+            <a:r>
+              <a:rPr lang="nl-NL" sz="1200" dirty="0"/>
+              <a:t> file</a:t>
+            </a:r>
+            <a:endParaRPr lang="en-GB" sz="1200" dirty="0"/>
+          </a:p>
+        </p:txBody>
+      </p:sp>
+      <p:cxnSp>
+        <p:nvCxnSpPr>
+          <p:cNvPr id="186" name="Connector: Elbow 185">
+            <a:extLst>
+              <a:ext uri="{FF2B5EF4-FFF2-40B4-BE49-F238E27FC236}">
+                <a16:creationId xmlns:a16="http://schemas.microsoft.com/office/drawing/2014/main" id="{2984064E-66EA-4D5E-A40D-6C466852BF37}"/>
+              </a:ext>
+            </a:extLst>
+          </p:cNvPr>
+          <p:cNvCxnSpPr>
+            <a:cxnSpLocks/>
+            <a:stCxn id="181" idx="3"/>
+            <a:endCxn id="188" idx="1"/>
+          </p:cNvCxnSpPr>
+          <p:nvPr/>
+        </p:nvCxnSpPr>
+        <p:spPr>
+          <a:xfrm>
+            <a:off x="9346229" y="4871006"/>
+            <a:ext cx="281357" cy="547320"/>
+          </a:xfrm>
+          <a:prstGeom prst="bentConnector3">
+            <a:avLst>
+              <a:gd name="adj1" fmla="val 50000"/>
+            </a:avLst>
+          </a:prstGeom>
+          <a:ln>
+            <a:tailEnd type="triangle"/>
+          </a:ln>
+        </p:spPr>
+        <p:style>
+          <a:lnRef idx="1">
+            <a:schemeClr val="accent1"/>
+          </a:lnRef>
+          <a:fillRef idx="0">
+            <a:schemeClr val="accent1"/>
+          </a:fillRef>
+          <a:effectRef idx="0">
+            <a:schemeClr val="accent1"/>
+          </a:effectRef>
+          <a:fontRef idx="minor">
+            <a:schemeClr val="tx1"/>
+          </a:fontRef>
+        </p:style>
+      </p:cxnSp>
+      <p:cxnSp>
+        <p:nvCxnSpPr>
+          <p:cNvPr id="187" name="Connector: Elbow 186">
+            <a:extLst>
+              <a:ext uri="{FF2B5EF4-FFF2-40B4-BE49-F238E27FC236}">
+                <a16:creationId xmlns:a16="http://schemas.microsoft.com/office/drawing/2014/main" id="{01A884A7-2F42-479E-AFEA-B2431382A912}"/>
+              </a:ext>
+            </a:extLst>
+          </p:cNvPr>
+          <p:cNvCxnSpPr>
+            <a:cxnSpLocks/>
+            <a:stCxn id="185" idx="3"/>
+            <a:endCxn id="188" idx="1"/>
+          </p:cNvCxnSpPr>
+          <p:nvPr/>
+        </p:nvCxnSpPr>
+        <p:spPr>
+          <a:xfrm flipV="1">
+            <a:off x="9346229" y="5418326"/>
+            <a:ext cx="281357" cy="814275"/>
+          </a:xfrm>
+          <a:prstGeom prst="bentConnector3">
+            <a:avLst>
+              <a:gd name="adj1" fmla="val 50000"/>
+            </a:avLst>
+          </a:prstGeom>
+          <a:ln>
+            <a:tailEnd type="triangle"/>
+          </a:ln>
+        </p:spPr>
+        <p:style>
+          <a:lnRef idx="1">
+            <a:schemeClr val="accent1"/>
+          </a:lnRef>
+          <a:fillRef idx="0">
+            <a:schemeClr val="accent1"/>
+          </a:fillRef>
+          <a:effectRef idx="0">
+            <a:schemeClr val="accent1"/>
+          </a:effectRef>
+          <a:fontRef idx="minor">
+            <a:schemeClr val="tx1"/>
+          </a:fontRef>
+        </p:style>
+      </p:cxnSp>
+      <p:sp>
+        <p:nvSpPr>
+          <p:cNvPr id="188" name="Rectangle 187">
+            <a:extLst>
+              <a:ext uri="{FF2B5EF4-FFF2-40B4-BE49-F238E27FC236}">
+                <a16:creationId xmlns:a16="http://schemas.microsoft.com/office/drawing/2014/main" id="{51F5C776-4F74-4B51-8835-769FA8C5231B}"/>
+              </a:ext>
+            </a:extLst>
+          </p:cNvPr>
+          <p:cNvSpPr/>
+          <p:nvPr/>
+        </p:nvSpPr>
+        <p:spPr>
+          <a:xfrm>
+            <a:off x="9627586" y="4871005"/>
+            <a:ext cx="1485900" cy="1094641"/>
+          </a:xfrm>
+          <a:prstGeom prst="rect">
+            <a:avLst/>
+          </a:prstGeom>
+        </p:spPr>
+        <p:style>
+          <a:lnRef idx="2">
+            <a:schemeClr val="accent1">
+              <a:shade val="50000"/>
+            </a:schemeClr>
+          </a:lnRef>
+          <a:fillRef idx="1">
+            <a:schemeClr val="accent1"/>
+          </a:fillRef>
+          <a:effectRef idx="0">
+            <a:schemeClr val="accent1"/>
+          </a:effectRef>
+          <a:fontRef idx="minor">
+            <a:schemeClr val="lt1"/>
+          </a:fontRef>
+        </p:style>
+        <p:txBody>
+          <a:bodyPr rtlCol="0" anchor="ctr"/>
+          <a:lstStyle/>
+          <a:p>
+            <a:pPr algn="ctr"/>
+            <a:r>
+              <a:rPr lang="en-GB" sz="1200" dirty="0"/>
+              <a:t>Aggregate exposed population per governorate </a:t>
+            </a:r>
+          </a:p>
+        </p:txBody>
+      </p:sp>
+      <p:sp>
+        <p:nvSpPr>
+          <p:cNvPr id="192" name="TextBox 191">
+            <a:extLst>
+              <a:ext uri="{FF2B5EF4-FFF2-40B4-BE49-F238E27FC236}">
+                <a16:creationId xmlns:a16="http://schemas.microsoft.com/office/drawing/2014/main" id="{0EC07D88-3593-4B87-AAB1-2D637A631212}"/>
+              </a:ext>
+            </a:extLst>
+          </p:cNvPr>
+          <p:cNvSpPr txBox="1"/>
+          <p:nvPr/>
+        </p:nvSpPr>
+        <p:spPr>
+          <a:xfrm>
+            <a:off x="2262553" y="2079997"/>
+            <a:ext cx="2312377" cy="276999"/>
+          </a:xfrm>
+          <a:prstGeom prst="rect">
+            <a:avLst/>
+          </a:prstGeom>
+          <a:noFill/>
+        </p:spPr>
+        <p:txBody>
+          <a:bodyPr wrap="square" rtlCol="0">
+            <a:spAutoFit/>
+          </a:bodyPr>
+          <a:lstStyle/>
+          <a:p>
+            <a:r>
+              <a:rPr lang="en-GB" sz="1200" b="1" dirty="0"/>
+              <a:t>Daily pipeline job</a:t>
+            </a:r>
+            <a:endParaRPr lang="nl-NL" sz="1200" b="1" dirty="0"/>
+          </a:p>
+        </p:txBody>
+      </p:sp>
+      <p:sp>
+        <p:nvSpPr>
+          <p:cNvPr id="30" name="Rectangle 29">
+            <a:extLst>
+              <a:ext uri="{FF2B5EF4-FFF2-40B4-BE49-F238E27FC236}">
+                <a16:creationId xmlns:a16="http://schemas.microsoft.com/office/drawing/2014/main" id="{04C1F8CF-EF69-417F-A4EF-E2BFE2A96F67}"/>
+              </a:ext>
+            </a:extLst>
+          </p:cNvPr>
+          <p:cNvSpPr/>
+          <p:nvPr/>
+        </p:nvSpPr>
+        <p:spPr>
+          <a:xfrm>
+            <a:off x="211015" y="2360799"/>
+            <a:ext cx="3745523" cy="2435469"/>
+          </a:xfrm>
+          <a:prstGeom prst="rect">
+            <a:avLst/>
+          </a:prstGeom>
+          <a:solidFill>
+            <a:schemeClr val="bg1"/>
+          </a:solidFill>
+          <a:ln>
+            <a:solidFill>
+              <a:srgbClr val="002060"/>
+            </a:solidFill>
+            <a:prstDash val="dash"/>
+          </a:ln>
+        </p:spPr>
+        <p:style>
+          <a:lnRef idx="2">
+            <a:schemeClr val="accent1">
+              <a:shade val="50000"/>
+            </a:schemeClr>
+          </a:lnRef>
+          <a:fillRef idx="1">
+            <a:schemeClr val="accent1"/>
+          </a:fillRef>
+          <a:effectRef idx="0">
+            <a:schemeClr val="accent1"/>
+          </a:effectRef>
+          <a:fontRef idx="minor">
+            <a:schemeClr val="lt1"/>
+          </a:fontRef>
+        </p:style>
+        <p:txBody>
+          <a:bodyPr rtlCol="0" anchor="ctr"/>
+          <a:lstStyle/>
+          <a:p>
+            <a:pPr algn="ctr"/>
+            <a:endParaRPr lang="en-GB" sz="1200" dirty="0"/>
+          </a:p>
+        </p:txBody>
+      </p:sp>
+      <p:sp>
+        <p:nvSpPr>
+          <p:cNvPr id="31" name="Rectangle 30">
+            <a:extLst>
+              <a:ext uri="{FF2B5EF4-FFF2-40B4-BE49-F238E27FC236}">
+                <a16:creationId xmlns:a16="http://schemas.microsoft.com/office/drawing/2014/main" id="{EB37F72B-AF52-443D-8907-D7A7BAAE152A}"/>
+              </a:ext>
+            </a:extLst>
+          </p:cNvPr>
+          <p:cNvSpPr/>
+          <p:nvPr/>
+        </p:nvSpPr>
+        <p:spPr>
+          <a:xfrm>
+            <a:off x="439615" y="2650946"/>
+            <a:ext cx="1485900" cy="835269"/>
+          </a:xfrm>
+          <a:prstGeom prst="rect">
+            <a:avLst/>
+          </a:prstGeom>
+          <a:solidFill>
+            <a:schemeClr val="bg1">
+              <a:lumMod val="95000"/>
+            </a:schemeClr>
+          </a:solidFill>
+        </p:spPr>
+        <p:style>
+          <a:lnRef idx="2">
+            <a:schemeClr val="accent1">
+              <a:shade val="50000"/>
+            </a:schemeClr>
+          </a:lnRef>
+          <a:fillRef idx="1">
+            <a:schemeClr val="accent1"/>
+          </a:fillRef>
+          <a:effectRef idx="0">
+            <a:schemeClr val="accent1"/>
+          </a:effectRef>
+          <a:fontRef idx="minor">
+            <a:schemeClr val="lt1"/>
+          </a:fontRef>
+        </p:style>
+        <p:txBody>
+          <a:bodyPr rtlCol="0" anchor="ctr"/>
+          <a:lstStyle/>
+          <a:p>
+            <a:pPr algn="ctr"/>
+            <a:r>
+              <a:rPr lang="en-GB" sz="1200" dirty="0">
+                <a:solidFill>
+                  <a:schemeClr val="tx1"/>
+                </a:solidFill>
+              </a:rPr>
+              <a:t>Historical heavy rainfall data</a:t>
+            </a:r>
+          </a:p>
+        </p:txBody>
+      </p:sp>
+      <p:sp>
+        <p:nvSpPr>
+          <p:cNvPr id="32" name="Rectangle 31">
+            <a:extLst>
+              <a:ext uri="{FF2B5EF4-FFF2-40B4-BE49-F238E27FC236}">
+                <a16:creationId xmlns:a16="http://schemas.microsoft.com/office/drawing/2014/main" id="{0DEC58D5-07F3-487A-8922-41F2BB1B128E}"/>
+              </a:ext>
+            </a:extLst>
+          </p:cNvPr>
+          <p:cNvSpPr/>
+          <p:nvPr/>
+        </p:nvSpPr>
+        <p:spPr>
+          <a:xfrm>
+            <a:off x="2382715" y="2650947"/>
+            <a:ext cx="1485900" cy="1987062"/>
+          </a:xfrm>
+          <a:prstGeom prst="rect">
+            <a:avLst/>
+          </a:prstGeom>
+          <a:solidFill>
+            <a:schemeClr val="bg1">
+              <a:lumMod val="65000"/>
+            </a:schemeClr>
+          </a:solidFill>
+        </p:spPr>
+        <p:style>
+          <a:lnRef idx="2">
+            <a:schemeClr val="accent1">
+              <a:shade val="50000"/>
+            </a:schemeClr>
+          </a:lnRef>
+          <a:fillRef idx="1">
+            <a:schemeClr val="accent1"/>
+          </a:fillRef>
+          <a:effectRef idx="0">
+            <a:schemeClr val="accent1"/>
+          </a:effectRef>
+          <a:fontRef idx="minor">
+            <a:schemeClr val="lt1"/>
+          </a:fontRef>
+        </p:style>
+        <p:txBody>
+          <a:bodyPr rtlCol="0" anchor="ctr"/>
+          <a:lstStyle/>
+          <a:p>
+            <a:pPr algn="ctr"/>
+            <a:r>
+              <a:rPr lang="en-GB" sz="1200" dirty="0"/>
+              <a:t>Threshold rainfall level per pixel</a:t>
+            </a:r>
+          </a:p>
+        </p:txBody>
+      </p:sp>
+      <p:cxnSp>
+        <p:nvCxnSpPr>
+          <p:cNvPr id="33" name="Connector: Elbow 32">
+            <a:extLst>
+              <a:ext uri="{FF2B5EF4-FFF2-40B4-BE49-F238E27FC236}">
+                <a16:creationId xmlns:a16="http://schemas.microsoft.com/office/drawing/2014/main" id="{EB08562E-6C11-4DBE-BCA3-418CF9C3522A}"/>
+              </a:ext>
+            </a:extLst>
+          </p:cNvPr>
+          <p:cNvCxnSpPr>
+            <a:cxnSpLocks/>
+            <a:stCxn id="31" idx="3"/>
+            <a:endCxn id="32" idx="1"/>
+          </p:cNvCxnSpPr>
+          <p:nvPr/>
+        </p:nvCxnSpPr>
+        <p:spPr>
+          <a:xfrm>
+            <a:off x="1925515" y="3068581"/>
+            <a:ext cx="457200" cy="575897"/>
+          </a:xfrm>
+          <a:prstGeom prst="bentConnector3">
+            <a:avLst/>
+          </a:prstGeom>
+          <a:ln>
+            <a:tailEnd type="triangle"/>
+          </a:ln>
+        </p:spPr>
+        <p:style>
+          <a:lnRef idx="1">
+            <a:schemeClr val="accent1"/>
+          </a:lnRef>
+          <a:fillRef idx="0">
+            <a:schemeClr val="accent1"/>
+          </a:fillRef>
+          <a:effectRef idx="0">
+            <a:schemeClr val="accent1"/>
+          </a:effectRef>
+          <a:fontRef idx="minor">
+            <a:schemeClr val="tx1"/>
+          </a:fontRef>
+        </p:style>
+      </p:cxnSp>
+      <p:sp>
+        <p:nvSpPr>
+          <p:cNvPr id="34" name="TextBox 33">
+            <a:extLst>
+              <a:ext uri="{FF2B5EF4-FFF2-40B4-BE49-F238E27FC236}">
+                <a16:creationId xmlns:a16="http://schemas.microsoft.com/office/drawing/2014/main" id="{904041BA-6022-4269-95AC-2E7F0B2583FF}"/>
+              </a:ext>
+            </a:extLst>
+          </p:cNvPr>
+          <p:cNvSpPr txBox="1"/>
+          <p:nvPr/>
+        </p:nvSpPr>
+        <p:spPr>
+          <a:xfrm>
+            <a:off x="184639" y="2360799"/>
+            <a:ext cx="3414238" cy="276999"/>
+          </a:xfrm>
+          <a:prstGeom prst="rect">
+            <a:avLst/>
+          </a:prstGeom>
+          <a:noFill/>
+        </p:spPr>
+        <p:txBody>
+          <a:bodyPr wrap="square" rtlCol="0">
+            <a:spAutoFit/>
+          </a:bodyPr>
+          <a:lstStyle/>
+          <a:p>
+            <a:r>
+              <a:rPr lang="en-GB" sz="1200" b="1" dirty="0"/>
+              <a:t>Manual one-off analysis (return period analysis)</a:t>
+            </a:r>
+            <a:endParaRPr lang="nl-NL" sz="1200" b="1" dirty="0"/>
+          </a:p>
+        </p:txBody>
+      </p:sp>
+    </p:spTree>
+    <p:extLst>
+      <p:ext uri="{BB962C8B-B14F-4D97-AF65-F5344CB8AC3E}">
+        <p14:creationId xmlns:p14="http://schemas.microsoft.com/office/powerpoint/2010/main" val="3246671445"/>
       </p:ext>
     </p:extLst>
   </p:cSld>

</xml_diff>